<commit_message>
Correcciòn de etilos, implementaciòn del hide de estados para metas y hide botones para rol de usuarios
</commit_message>
<xml_diff>
--- a/djangoISSSTE/static/ppt/ppt-generados/FichaTecnicaAvance_1.pptx
+++ b/djangoISSSTE/static/ppt/ppt-generados/FichaTecnicaAvance_1.pptx
@@ -3674,7 +3674,7 @@
                         </a:defRPr>
                       </a:pPr>
                       <a:r>
-                        <a:t>Alimentación </a:t>
+                        <a:t>Educación </a:t>
                       </a:r>
                       <a:endParaRPr lang="es-ES_tradnl" sz="1100" b="0" dirty="0">
                         <a:solidFill>
@@ -3799,7 +3799,7 @@
                         </a:defRPr>
                       </a:pPr>
                       <a:r>
-                        <a:t>Inseguridad alimentaria </a:t>
+                        <a:t>Población de 3 a 15 años que no asiste a la escuela</a:t>
                       </a:r>
                       <a:endParaRPr lang="es-ES_tradnl" sz="1100" b="0" dirty="0">
                         <a:solidFill>
@@ -3938,7 +3938,7 @@
                         </a:defRPr>
                       </a:pPr>
                       <a:r>
-                        <a:t>Otorgar alimentos en guarderías infantiles ISSSTE y comunicarles que este apoyo les da a sus hijos acceso a una alimentación sana, variada y suficiente</a:t>
+                        <a:t>Certificar estancias y guarderías como equivalentes a preescolar</a:t>
                       </a:r>
                       <a:endParaRPr lang="es-ES_tradnl" sz="1100" b="0" dirty="0">
                         <a:solidFill>
@@ -4081,7 +4081,7 @@
                         </a:defRPr>
                       </a:pPr>
                       <a:r>
-                        <a:t>No. De niños y niñas beneficiados</a:t>
+                        <a:t>No. De niños y niñas entre 3-5 años atendidos en estancias y guarderías con preescolar</a:t>
                       </a:r>
                       <a:endParaRPr lang="es-ES_tradnl" sz="1100" b="0" dirty="0">
                         <a:solidFill>
@@ -4428,8 +4428,7 @@
                         </a:defRPr>
                       </a:pPr>
                       <a:r>
-                        <a:t>1/ Corresponde al total de las niñas y niños atendidos por mes, misma que incluye los movimientos naturales en la población, por lo que la cifra de niños atendidos por mes no puede acumularse.-2/ El monto reportado considera el costo de dos alimentos por niños por día durante el periodo enero-julio 2016.    </a:t>
+                        <a:t>Nota: Corresponde a la población inscrita, la cual considera los movimientos naturales del servicio (altas y bajas) a lo largo de todo el año. Las estancias contratadas y las organizaciones de la socidedad civil cuentan con clave de centro de trabajo que proporciona la SEP; para el caso de las estancias propias, el ISSSTE tiene vigente un convenio de colaboración con la SEP para que los niños de preescolar obtengan la validez oficial   </a:t>
                       </a:r>
                       <a:endParaRPr lang="es-ES_tradnl" sz="1100" b="0" dirty="0">
                         <a:solidFill>
@@ -5113,7 +5112,7 @@
                         </a:defRPr>
                       </a:pPr>
                       <a:r>
-                        <a:t>Aguascalientes</a:t>
+                        <a:t>Chihuahua</a:t>
                       </a:r>
                       <a:endParaRPr lang="es-ES_tradnl" sz="1100" dirty="0">
                         <a:latin typeface="Arial" charset="0"/>
@@ -5138,7 +5137,7 @@
                         </a:defRPr>
                       </a:pPr>
                       <a:r>
-                        <a:t>1523.0</a:t>
+                        <a:t>329.0</a:t>
                       </a:r>
                       <a:endParaRPr lang="es-ES_tradnl" sz="1100" dirty="0">
                         <a:latin typeface="Arial" charset="0"/>
@@ -5163,7 +5162,7 @@
                         </a:defRPr>
                       </a:pPr>
                       <a:r>
-                        <a:t>1560.0</a:t>
+                        <a:t>329.0</a:t>
                       </a:r>
                       <a:endParaRPr lang="es-ES_tradnl" sz="1100" dirty="0">
                         <a:latin typeface="Arial" charset="0"/>
@@ -5438,7 +5437,7 @@
                         </a:defRPr>
                       </a:pPr>
                       <a:r>
-                        <a:t>4606.0</a:t>
+                        <a:t>987.0</a:t>
                       </a:r>
                       <a:endParaRPr lang="es-ES_tradnl" sz="1100" dirty="0">
                         <a:latin typeface="Arial" charset="0"/>
@@ -5463,7 +5462,7 @@
                         </a:defRPr>
                       </a:pPr>
                       <a:r>
-                        <a:t>4085522.0</a:t>
+                        <a:t>26583858.0</a:t>
                       </a:r>
                       <a:endParaRPr lang="es-ES_tradnl" sz="1100" kern="1200" dirty="0">
                         <a:solidFill>
@@ -5515,7 +5514,7 @@
                         </a:defRPr>
                       </a:pPr>
                       <a:r>
-                        <a:t>Jesús María</a:t>
+                        <a:t>Juárez</a:t>
                       </a:r>
                       <a:endParaRPr lang="es-ES_tradnl" sz="1100" dirty="0">
                         <a:latin typeface="Arial" charset="0"/>
@@ -5540,7 +5539,7 @@
                         </a:defRPr>
                       </a:pPr>
                       <a:r>
-                        <a:t>39.0</a:t>
+                        <a:t>153.0</a:t>
                       </a:r>
                       <a:endParaRPr lang="es-ES_tradnl" sz="1100" dirty="0">
                         <a:latin typeface="Arial" charset="0"/>
@@ -5565,7 +5564,7 @@
                         </a:defRPr>
                       </a:pPr>
                       <a:r>
-                        <a:t>39.0</a:t>
+                        <a:t>154.0</a:t>
                       </a:r>
                       <a:endParaRPr lang="es-ES_tradnl" sz="1100">
                         <a:latin typeface="Arial" charset="0"/>
@@ -5840,7 +5839,7 @@
                         </a:defRPr>
                       </a:pPr>
                       <a:r>
-                        <a:t>117.0</a:t>
+                        <a:t>460.0</a:t>
                       </a:r>
                       <a:endParaRPr lang="es-ES_tradnl" sz="1100">
                         <a:latin typeface="Arial" charset="0"/>
@@ -5865,7 +5864,7 @@
                         </a:defRPr>
                       </a:pPr>
                       <a:r>
-                        <a:t>103779.0</a:t>
+                        <a:t>12389640.0</a:t>
                       </a:r>
                       <a:endParaRPr lang="es-ES_tradnl" sz="1100">
                         <a:latin typeface="Arial" charset="0"/>
@@ -5883,39 +5882,20 @@
                     <a:bodyPr/>
                     <a:lstStyle/>
                     <a:p>
-                      <a:pPr>
-                        <a:defRPr sz="800">
-                          <a:solidFill>
-                            <a:srgbClr val="0B0B0B"/>
-                          </a:solidFill>
-                          <a:latin typeface="Arial"/>
-                        </a:defRPr>
-                      </a:pPr>
-                      <a:endParaRPr lang="es-ES_tradnl" sz="1100" dirty="0">
-                        <a:latin typeface="Arial" charset="0"/>
-                        <a:ea typeface="Arial" charset="0"/>
-                        <a:cs typeface="Arial" charset="0"/>
-                      </a:endParaRPr>
-                    </a:p>
-                  </a:txBody>
-                  <a:tcPr marL="36000" marR="36000" marT="36000" marB="36000"/>
-                </a:tc>
-                <a:tc>
-                  <a:txBody>
-                    <a:bodyPr/>
-                    <a:lstStyle/>
-                    <a:p>
-                      <a:pPr>
-                        <a:defRPr sz="800">
-                          <a:solidFill>
-                            <a:srgbClr val="0B0B0B"/>
-                          </a:solidFill>
-                          <a:latin typeface="Arial"/>
-                        </a:defRPr>
-                      </a:pPr>
-                      <a:r>
-                        <a:t>Pabellón de Arteaga</a:t>
-                      </a:r>
+                      <a:endParaRPr lang="es-ES_tradnl" sz="1100" dirty="0">
+                        <a:latin typeface="Arial" charset="0"/>
+                        <a:ea typeface="Arial" charset="0"/>
+                        <a:cs typeface="Arial" charset="0"/>
+                      </a:endParaRPr>
+                    </a:p>
+                  </a:txBody>
+                  <a:tcPr marL="36000" marR="36000" marT="36000" marB="36000"/>
+                </a:tc>
+                <a:tc>
+                  <a:txBody>
+                    <a:bodyPr/>
+                    <a:lstStyle/>
+                    <a:p>
                       <a:endParaRPr lang="es-ES_tradnl" sz="1100">
                         <a:latin typeface="Arial" charset="0"/>
                         <a:ea typeface="Arial" charset="0"/>
@@ -5930,17 +5910,6 @@
                     <a:bodyPr/>
                     <a:lstStyle/>
                     <a:p>
-                      <a:pPr>
-                        <a:defRPr sz="800">
-                          <a:solidFill>
-                            <a:srgbClr val="0B0B0B"/>
-                          </a:solidFill>
-                          <a:latin typeface="Arial"/>
-                        </a:defRPr>
-                      </a:pPr>
-                      <a:r>
-                        <a:t>70.0</a:t>
-                      </a:r>
                       <a:endParaRPr lang="es-ES_tradnl" sz="1100">
                         <a:latin typeface="Arial" charset="0"/>
                         <a:ea typeface="Arial" charset="0"/>
@@ -5955,42 +5924,20 @@
                     <a:bodyPr/>
                     <a:lstStyle/>
                     <a:p>
-                      <a:pPr>
-                        <a:defRPr sz="800">
-                          <a:solidFill>
-                            <a:srgbClr val="0B0B0B"/>
-                          </a:solidFill>
-                          <a:latin typeface="Arial"/>
-                        </a:defRPr>
-                      </a:pPr>
-                      <a:r>
-                        <a:t>70.0</a:t>
-                      </a:r>
-                      <a:endParaRPr lang="es-ES_tradnl" sz="1100" dirty="0">
-                        <a:latin typeface="Arial" charset="0"/>
-                        <a:ea typeface="Arial" charset="0"/>
-                        <a:cs typeface="Arial" charset="0"/>
-                      </a:endParaRPr>
-                    </a:p>
-                  </a:txBody>
-                  <a:tcPr marL="36000" marR="36000" marT="36000" marB="36000"/>
-                </a:tc>
-                <a:tc>
-                  <a:txBody>
-                    <a:bodyPr/>
-                    <a:lstStyle/>
-                    <a:p>
-                      <a:pPr>
-                        <a:defRPr sz="800">
-                          <a:solidFill>
-                            <a:srgbClr val="0B0B0B"/>
-                          </a:solidFill>
-                          <a:latin typeface="Arial"/>
-                        </a:defRPr>
-                      </a:pPr>
-                      <a:r>
-                        <a:t>0.0</a:t>
-                      </a:r>
+                      <a:endParaRPr lang="es-ES_tradnl" sz="1100" dirty="0">
+                        <a:latin typeface="Arial" charset="0"/>
+                        <a:ea typeface="Arial" charset="0"/>
+                        <a:cs typeface="Arial" charset="0"/>
+                      </a:endParaRPr>
+                    </a:p>
+                  </a:txBody>
+                  <a:tcPr marL="36000" marR="36000" marT="36000" marB="36000"/>
+                </a:tc>
+                <a:tc>
+                  <a:txBody>
+                    <a:bodyPr/>
+                    <a:lstStyle/>
+                    <a:p>
                       <a:endParaRPr lang="es-ES_tradnl" sz="1100">
                         <a:latin typeface="Arial" charset="0"/>
                         <a:ea typeface="Arial" charset="0"/>
@@ -6005,17 +5952,6 @@
                     <a:bodyPr/>
                     <a:lstStyle/>
                     <a:p>
-                      <a:pPr>
-                        <a:defRPr sz="800">
-                          <a:solidFill>
-                            <a:srgbClr val="0B0B0B"/>
-                          </a:solidFill>
-                          <a:latin typeface="Arial"/>
-                        </a:defRPr>
-                      </a:pPr>
-                      <a:r>
-                        <a:t>0.0</a:t>
-                      </a:r>
                       <a:endParaRPr lang="es-ES_tradnl" sz="1100">
                         <a:latin typeface="Arial" charset="0"/>
                         <a:ea typeface="Arial" charset="0"/>
@@ -6030,42 +5966,20 @@
                     <a:bodyPr/>
                     <a:lstStyle/>
                     <a:p>
-                      <a:pPr>
-                        <a:defRPr sz="800">
-                          <a:solidFill>
-                            <a:srgbClr val="0B0B0B"/>
-                          </a:solidFill>
-                          <a:latin typeface="Arial"/>
-                        </a:defRPr>
-                      </a:pPr>
-                      <a:r>
-                        <a:t>0.0</a:t>
-                      </a:r>
-                      <a:endParaRPr lang="es-ES_tradnl" sz="1100" dirty="0">
-                        <a:latin typeface="Arial" charset="0"/>
-                        <a:ea typeface="Arial" charset="0"/>
-                        <a:cs typeface="Arial" charset="0"/>
-                      </a:endParaRPr>
-                    </a:p>
-                  </a:txBody>
-                  <a:tcPr marL="36000" marR="36000" marT="36000" marB="36000"/>
-                </a:tc>
-                <a:tc>
-                  <a:txBody>
-                    <a:bodyPr/>
-                    <a:lstStyle/>
-                    <a:p>
-                      <a:pPr>
-                        <a:defRPr sz="800">
-                          <a:solidFill>
-                            <a:srgbClr val="0B0B0B"/>
-                          </a:solidFill>
-                          <a:latin typeface="Arial"/>
-                        </a:defRPr>
-                      </a:pPr>
-                      <a:r>
-                        <a:t>0.0</a:t>
-                      </a:r>
+                      <a:endParaRPr lang="es-ES_tradnl" sz="1100" dirty="0">
+                        <a:latin typeface="Arial" charset="0"/>
+                        <a:ea typeface="Arial" charset="0"/>
+                        <a:cs typeface="Arial" charset="0"/>
+                      </a:endParaRPr>
+                    </a:p>
+                  </a:txBody>
+                  <a:tcPr marL="36000" marR="36000" marT="36000" marB="36000"/>
+                </a:tc>
+                <a:tc>
+                  <a:txBody>
+                    <a:bodyPr/>
+                    <a:lstStyle/>
+                    <a:p>
                       <a:endParaRPr lang="es-ES_tradnl" sz="1100">
                         <a:latin typeface="Arial" charset="0"/>
                         <a:ea typeface="Arial" charset="0"/>
@@ -6080,42 +5994,20 @@
                     <a:bodyPr/>
                     <a:lstStyle/>
                     <a:p>
-                      <a:pPr>
-                        <a:defRPr sz="800">
-                          <a:solidFill>
-                            <a:srgbClr val="0B0B0B"/>
-                          </a:solidFill>
-                          <a:latin typeface="Arial"/>
-                        </a:defRPr>
-                      </a:pPr>
-                      <a:r>
-                        <a:t>0.0</a:t>
-                      </a:r>
-                      <a:endParaRPr lang="es-ES_tradnl" sz="1100" dirty="0">
-                        <a:latin typeface="Arial" charset="0"/>
-                        <a:ea typeface="Arial" charset="0"/>
-                        <a:cs typeface="Arial" charset="0"/>
-                      </a:endParaRPr>
-                    </a:p>
-                  </a:txBody>
-                  <a:tcPr marL="36000" marR="36000" marT="36000" marB="36000"/>
-                </a:tc>
-                <a:tc>
-                  <a:txBody>
-                    <a:bodyPr/>
-                    <a:lstStyle/>
-                    <a:p>
-                      <a:pPr>
-                        <a:defRPr sz="800">
-                          <a:solidFill>
-                            <a:srgbClr val="0B0B0B"/>
-                          </a:solidFill>
-                          <a:latin typeface="Arial"/>
-                        </a:defRPr>
-                      </a:pPr>
-                      <a:r>
-                        <a:t>0.0</a:t>
-                      </a:r>
+                      <a:endParaRPr lang="es-ES_tradnl" sz="1100" dirty="0">
+                        <a:latin typeface="Arial" charset="0"/>
+                        <a:ea typeface="Arial" charset="0"/>
+                        <a:cs typeface="Arial" charset="0"/>
+                      </a:endParaRPr>
+                    </a:p>
+                  </a:txBody>
+                  <a:tcPr marL="36000" marR="36000" marT="36000" marB="36000"/>
+                </a:tc>
+                <a:tc>
+                  <a:txBody>
+                    <a:bodyPr/>
+                    <a:lstStyle/>
+                    <a:p>
                       <a:endParaRPr lang="es-ES_tradnl" sz="1100">
                         <a:latin typeface="Arial" charset="0"/>
                         <a:ea typeface="Arial" charset="0"/>
@@ -6130,17 +6022,6 @@
                     <a:bodyPr/>
                     <a:lstStyle/>
                     <a:p>
-                      <a:pPr>
-                        <a:defRPr sz="800">
-                          <a:solidFill>
-                            <a:srgbClr val="0B0B0B"/>
-                          </a:solidFill>
-                          <a:latin typeface="Arial"/>
-                        </a:defRPr>
-                      </a:pPr>
-                      <a:r>
-                        <a:t>0.0</a:t>
-                      </a:r>
                       <a:endParaRPr lang="es-ES_tradnl" sz="1100">
                         <a:latin typeface="Arial" charset="0"/>
                         <a:ea typeface="Arial" charset="0"/>
@@ -6155,17 +6036,6 @@
                     <a:bodyPr/>
                     <a:lstStyle/>
                     <a:p>
-                      <a:pPr>
-                        <a:defRPr sz="800">
-                          <a:solidFill>
-                            <a:srgbClr val="0B0B0B"/>
-                          </a:solidFill>
-                          <a:latin typeface="Arial"/>
-                        </a:defRPr>
-                      </a:pPr>
-                      <a:r>
-                        <a:t>0.0</a:t>
-                      </a:r>
                       <a:endParaRPr lang="es-ES_tradnl" sz="1100">
                         <a:latin typeface="Arial" charset="0"/>
                         <a:ea typeface="Arial" charset="0"/>
@@ -6180,17 +6050,6 @@
                     <a:bodyPr/>
                     <a:lstStyle/>
                     <a:p>
-                      <a:pPr>
-                        <a:defRPr sz="800">
-                          <a:solidFill>
-                            <a:srgbClr val="0B0B0B"/>
-                          </a:solidFill>
-                          <a:latin typeface="Arial"/>
-                        </a:defRPr>
-                      </a:pPr>
-                      <a:r>
-                        <a:t>0.0</a:t>
-                      </a:r>
                       <a:endParaRPr lang="es-ES_tradnl" sz="1100">
                         <a:latin typeface="Arial" charset="0"/>
                         <a:ea typeface="Arial" charset="0"/>
@@ -6205,67 +6064,34 @@
                     <a:bodyPr/>
                     <a:lstStyle/>
                     <a:p>
-                      <a:pPr>
-                        <a:defRPr sz="800">
-                          <a:solidFill>
-                            <a:srgbClr val="0B0B0B"/>
-                          </a:solidFill>
-                          <a:latin typeface="Arial"/>
-                        </a:defRPr>
-                      </a:pPr>
-                      <a:r>
-                        <a:t>0.0</a:t>
-                      </a:r>
-                      <a:endParaRPr lang="es-ES_tradnl" sz="1100" dirty="0">
-                        <a:latin typeface="Arial" charset="0"/>
-                        <a:ea typeface="Arial" charset="0"/>
-                        <a:cs typeface="Arial" charset="0"/>
-                      </a:endParaRPr>
-                    </a:p>
-                  </a:txBody>
-                  <a:tcPr marL="36000" marR="36000" marT="36000" marB="36000"/>
-                </a:tc>
-                <a:tc>
-                  <a:txBody>
-                    <a:bodyPr/>
-                    <a:lstStyle/>
-                    <a:p>
-                      <a:pPr>
-                        <a:defRPr sz="800">
-                          <a:solidFill>
-                            <a:srgbClr val="0B0B0B"/>
-                          </a:solidFill>
-                          <a:latin typeface="Arial"/>
-                        </a:defRPr>
-                      </a:pPr>
-                      <a:r>
-                        <a:t>210.0</a:t>
-                      </a:r>
-                      <a:endParaRPr lang="es-ES_tradnl" sz="1100" dirty="0">
-                        <a:latin typeface="Arial" charset="0"/>
-                        <a:ea typeface="Arial" charset="0"/>
-                        <a:cs typeface="Arial" charset="0"/>
-                      </a:endParaRPr>
-                    </a:p>
-                  </a:txBody>
-                  <a:tcPr marL="36000" marR="36000" marT="36000" marB="36000"/>
-                </a:tc>
-                <a:tc>
-                  <a:txBody>
-                    <a:bodyPr/>
-                    <a:lstStyle/>
-                    <a:p>
-                      <a:pPr>
-                        <a:defRPr sz="800">
-                          <a:solidFill>
-                            <a:srgbClr val="0B0B0B"/>
-                          </a:solidFill>
-                          <a:latin typeface="Arial"/>
-                        </a:defRPr>
-                      </a:pPr>
-                      <a:r>
-                        <a:t>186270.0</a:t>
-                      </a:r>
+                      <a:endParaRPr lang="es-ES_tradnl" sz="1100" dirty="0">
+                        <a:latin typeface="Arial" charset="0"/>
+                        <a:ea typeface="Arial" charset="0"/>
+                        <a:cs typeface="Arial" charset="0"/>
+                      </a:endParaRPr>
+                    </a:p>
+                  </a:txBody>
+                  <a:tcPr marL="36000" marR="36000" marT="36000" marB="36000"/>
+                </a:tc>
+                <a:tc>
+                  <a:txBody>
+                    <a:bodyPr/>
+                    <a:lstStyle/>
+                    <a:p>
+                      <a:endParaRPr lang="es-ES_tradnl" sz="1100" dirty="0">
+                        <a:latin typeface="Arial" charset="0"/>
+                        <a:ea typeface="Arial" charset="0"/>
+                        <a:cs typeface="Arial" charset="0"/>
+                      </a:endParaRPr>
+                    </a:p>
+                  </a:txBody>
+                  <a:tcPr marL="36000" marR="36000" marT="36000" marB="36000"/>
+                </a:tc>
+                <a:tc>
+                  <a:txBody>
+                    <a:bodyPr/>
+                    <a:lstStyle/>
+                    <a:p>
                       <a:endParaRPr lang="es-ES_tradnl" sz="1100">
                         <a:latin typeface="Arial" charset="0"/>
                         <a:ea typeface="Arial" charset="0"/>
@@ -6282,39 +6108,20 @@
                     <a:bodyPr/>
                     <a:lstStyle/>
                     <a:p>
-                      <a:pPr>
-                        <a:defRPr sz="800">
-                          <a:solidFill>
-                            <a:srgbClr val="0B0B0B"/>
-                          </a:solidFill>
-                          <a:latin typeface="Arial"/>
-                        </a:defRPr>
-                      </a:pPr>
-                      <a:endParaRPr lang="es-ES_tradnl" sz="1100" dirty="0">
-                        <a:latin typeface="Arial" charset="0"/>
-                        <a:ea typeface="Arial" charset="0"/>
-                        <a:cs typeface="Arial" charset="0"/>
-                      </a:endParaRPr>
-                    </a:p>
-                  </a:txBody>
-                  <a:tcPr marL="36000" marR="36000" marT="36000" marB="36000"/>
-                </a:tc>
-                <a:tc>
-                  <a:txBody>
-                    <a:bodyPr/>
-                    <a:lstStyle/>
-                    <a:p>
-                      <a:pPr>
-                        <a:defRPr sz="800">
-                          <a:solidFill>
-                            <a:srgbClr val="0B0B0B"/>
-                          </a:solidFill>
-                          <a:latin typeface="Arial"/>
-                        </a:defRPr>
-                      </a:pPr>
-                      <a:r>
-                        <a:t>Rincón de Romos</a:t>
-                      </a:r>
+                      <a:endParaRPr lang="es-ES_tradnl" sz="1100" dirty="0">
+                        <a:latin typeface="Arial" charset="0"/>
+                        <a:ea typeface="Arial" charset="0"/>
+                        <a:cs typeface="Arial" charset="0"/>
+                      </a:endParaRPr>
+                    </a:p>
+                  </a:txBody>
+                  <a:tcPr marL="36000" marR="36000" marT="36000" marB="36000"/>
+                </a:tc>
+                <a:tc>
+                  <a:txBody>
+                    <a:bodyPr/>
+                    <a:lstStyle/>
+                    <a:p>
                       <a:endParaRPr lang="es-ES_tradnl" sz="1100">
                         <a:latin typeface="Arial" charset="0"/>
                         <a:ea typeface="Arial" charset="0"/>
@@ -6329,17 +6136,6 @@
                     <a:bodyPr/>
                     <a:lstStyle/>
                     <a:p>
-                      <a:pPr>
-                        <a:defRPr sz="800">
-                          <a:solidFill>
-                            <a:srgbClr val="0B0B0B"/>
-                          </a:solidFill>
-                          <a:latin typeface="Arial"/>
-                        </a:defRPr>
-                      </a:pPr>
-                      <a:r>
-                        <a:t>67.0</a:t>
-                      </a:r>
                       <a:endParaRPr lang="es-ES_tradnl" sz="1100">
                         <a:latin typeface="Arial" charset="0"/>
                         <a:ea typeface="Arial" charset="0"/>
@@ -6354,67 +6150,34 @@
                     <a:bodyPr/>
                     <a:lstStyle/>
                     <a:p>
-                      <a:pPr>
-                        <a:defRPr sz="800">
-                          <a:solidFill>
-                            <a:srgbClr val="0B0B0B"/>
-                          </a:solidFill>
-                          <a:latin typeface="Arial"/>
-                        </a:defRPr>
-                      </a:pPr>
-                      <a:r>
-                        <a:t>68.0</a:t>
-                      </a:r>
-                      <a:endParaRPr lang="es-ES_tradnl" sz="1100" dirty="0">
-                        <a:latin typeface="Arial" charset="0"/>
-                        <a:ea typeface="Arial" charset="0"/>
-                        <a:cs typeface="Arial" charset="0"/>
-                      </a:endParaRPr>
-                    </a:p>
-                  </a:txBody>
-                  <a:tcPr marL="36000" marR="36000" marT="36000" marB="36000"/>
-                </a:tc>
-                <a:tc>
-                  <a:txBody>
-                    <a:bodyPr/>
-                    <a:lstStyle/>
-                    <a:p>
-                      <a:pPr>
-                        <a:defRPr sz="800">
-                          <a:solidFill>
-                            <a:srgbClr val="0B0B0B"/>
-                          </a:solidFill>
-                          <a:latin typeface="Arial"/>
-                        </a:defRPr>
-                      </a:pPr>
-                      <a:r>
-                        <a:t>0.0</a:t>
-                      </a:r>
-                      <a:endParaRPr lang="es-ES_tradnl" sz="1100" dirty="0">
-                        <a:latin typeface="Arial" charset="0"/>
-                        <a:ea typeface="Arial" charset="0"/>
-                        <a:cs typeface="Arial" charset="0"/>
-                      </a:endParaRPr>
-                    </a:p>
-                  </a:txBody>
-                  <a:tcPr marL="36000" marR="36000" marT="36000" marB="36000"/>
-                </a:tc>
-                <a:tc>
-                  <a:txBody>
-                    <a:bodyPr/>
-                    <a:lstStyle/>
-                    <a:p>
-                      <a:pPr>
-                        <a:defRPr sz="800">
-                          <a:solidFill>
-                            <a:srgbClr val="0B0B0B"/>
-                          </a:solidFill>
-                          <a:latin typeface="Arial"/>
-                        </a:defRPr>
-                      </a:pPr>
-                      <a:r>
-                        <a:t>0.0</a:t>
-                      </a:r>
+                      <a:endParaRPr lang="es-ES_tradnl" sz="1100" dirty="0">
+                        <a:latin typeface="Arial" charset="0"/>
+                        <a:ea typeface="Arial" charset="0"/>
+                        <a:cs typeface="Arial" charset="0"/>
+                      </a:endParaRPr>
+                    </a:p>
+                  </a:txBody>
+                  <a:tcPr marL="36000" marR="36000" marT="36000" marB="36000"/>
+                </a:tc>
+                <a:tc>
+                  <a:txBody>
+                    <a:bodyPr/>
+                    <a:lstStyle/>
+                    <a:p>
+                      <a:endParaRPr lang="es-ES_tradnl" sz="1100" dirty="0">
+                        <a:latin typeface="Arial" charset="0"/>
+                        <a:ea typeface="Arial" charset="0"/>
+                        <a:cs typeface="Arial" charset="0"/>
+                      </a:endParaRPr>
+                    </a:p>
+                  </a:txBody>
+                  <a:tcPr marL="36000" marR="36000" marT="36000" marB="36000"/>
+                </a:tc>
+                <a:tc>
+                  <a:txBody>
+                    <a:bodyPr/>
+                    <a:lstStyle/>
+                    <a:p>
                       <a:endParaRPr lang="es-ES_tradnl" sz="1100">
                         <a:latin typeface="Arial" charset="0"/>
                         <a:ea typeface="Arial" charset="0"/>
@@ -6429,17 +6192,6 @@
                     <a:bodyPr/>
                     <a:lstStyle/>
                     <a:p>
-                      <a:pPr>
-                        <a:defRPr sz="800">
-                          <a:solidFill>
-                            <a:srgbClr val="0B0B0B"/>
-                          </a:solidFill>
-                          <a:latin typeface="Arial"/>
-                        </a:defRPr>
-                      </a:pPr>
-                      <a:r>
-                        <a:t>0.0</a:t>
-                      </a:r>
                       <a:endParaRPr lang="es-ES_tradnl" sz="1100">
                         <a:latin typeface="Arial" charset="0"/>
                         <a:ea typeface="Arial" charset="0"/>
@@ -6454,42 +6206,20 @@
                     <a:bodyPr/>
                     <a:lstStyle/>
                     <a:p>
-                      <a:pPr>
-                        <a:defRPr sz="800">
-                          <a:solidFill>
-                            <a:srgbClr val="0B0B0B"/>
-                          </a:solidFill>
-                          <a:latin typeface="Arial"/>
-                        </a:defRPr>
-                      </a:pPr>
-                      <a:r>
-                        <a:t>0.0</a:t>
-                      </a:r>
-                      <a:endParaRPr lang="es-ES_tradnl" sz="1100" dirty="0">
-                        <a:latin typeface="Arial" charset="0"/>
-                        <a:ea typeface="Arial" charset="0"/>
-                        <a:cs typeface="Arial" charset="0"/>
-                      </a:endParaRPr>
-                    </a:p>
-                  </a:txBody>
-                  <a:tcPr marL="36000" marR="36000" marT="36000" marB="36000"/>
-                </a:tc>
-                <a:tc>
-                  <a:txBody>
-                    <a:bodyPr/>
-                    <a:lstStyle/>
-                    <a:p>
-                      <a:pPr>
-                        <a:defRPr sz="800">
-                          <a:solidFill>
-                            <a:srgbClr val="0B0B0B"/>
-                          </a:solidFill>
-                          <a:latin typeface="Arial"/>
-                        </a:defRPr>
-                      </a:pPr>
-                      <a:r>
-                        <a:t>0.0</a:t>
-                      </a:r>
+                      <a:endParaRPr lang="es-ES_tradnl" sz="1100" dirty="0">
+                        <a:latin typeface="Arial" charset="0"/>
+                        <a:ea typeface="Arial" charset="0"/>
+                        <a:cs typeface="Arial" charset="0"/>
+                      </a:endParaRPr>
+                    </a:p>
+                  </a:txBody>
+                  <a:tcPr marL="36000" marR="36000" marT="36000" marB="36000"/>
+                </a:tc>
+                <a:tc>
+                  <a:txBody>
+                    <a:bodyPr/>
+                    <a:lstStyle/>
+                    <a:p>
                       <a:endParaRPr lang="es-ES_tradnl" sz="1100">
                         <a:latin typeface="Arial" charset="0"/>
                         <a:ea typeface="Arial" charset="0"/>
@@ -6504,17 +6234,6 @@
                     <a:bodyPr/>
                     <a:lstStyle/>
                     <a:p>
-                      <a:pPr>
-                        <a:defRPr sz="800">
-                          <a:solidFill>
-                            <a:srgbClr val="0B0B0B"/>
-                          </a:solidFill>
-                          <a:latin typeface="Arial"/>
-                        </a:defRPr>
-                      </a:pPr>
-                      <a:r>
-                        <a:t>0.0</a:t>
-                      </a:r>
                       <a:endParaRPr lang="es-ES_tradnl" sz="1100">
                         <a:latin typeface="Arial" charset="0"/>
                         <a:ea typeface="Arial" charset="0"/>
@@ -6529,17 +6248,6 @@
                     <a:bodyPr/>
                     <a:lstStyle/>
                     <a:p>
-                      <a:pPr>
-                        <a:defRPr sz="800">
-                          <a:solidFill>
-                            <a:srgbClr val="0B0B0B"/>
-                          </a:solidFill>
-                          <a:latin typeface="Arial"/>
-                        </a:defRPr>
-                      </a:pPr>
-                      <a:r>
-                        <a:t>0.0</a:t>
-                      </a:r>
                       <a:endParaRPr lang="es-ES_tradnl" sz="1100">
                         <a:latin typeface="Arial" charset="0"/>
                         <a:ea typeface="Arial" charset="0"/>
@@ -6554,17 +6262,6 @@
                     <a:bodyPr/>
                     <a:lstStyle/>
                     <a:p>
-                      <a:pPr>
-                        <a:defRPr sz="800">
-                          <a:solidFill>
-                            <a:srgbClr val="0B0B0B"/>
-                          </a:solidFill>
-                          <a:latin typeface="Arial"/>
-                        </a:defRPr>
-                      </a:pPr>
-                      <a:r>
-                        <a:t>0.0</a:t>
-                      </a:r>
                       <a:endParaRPr lang="es-ES_tradnl" sz="1100">
                         <a:latin typeface="Arial" charset="0"/>
                         <a:ea typeface="Arial" charset="0"/>
@@ -6579,17 +6276,6 @@
                     <a:bodyPr/>
                     <a:lstStyle/>
                     <a:p>
-                      <a:pPr>
-                        <a:defRPr sz="800">
-                          <a:solidFill>
-                            <a:srgbClr val="0B0B0B"/>
-                          </a:solidFill>
-                          <a:latin typeface="Arial"/>
-                        </a:defRPr>
-                      </a:pPr>
-                      <a:r>
-                        <a:t>0.0</a:t>
-                      </a:r>
                       <a:endParaRPr lang="es-ES_tradnl" sz="1100">
                         <a:latin typeface="Arial" charset="0"/>
                         <a:ea typeface="Arial" charset="0"/>
@@ -6604,42 +6290,20 @@
                     <a:bodyPr/>
                     <a:lstStyle/>
                     <a:p>
-                      <a:pPr>
-                        <a:defRPr sz="800">
-                          <a:solidFill>
-                            <a:srgbClr val="0B0B0B"/>
-                          </a:solidFill>
-                          <a:latin typeface="Arial"/>
-                        </a:defRPr>
-                      </a:pPr>
-                      <a:r>
-                        <a:t>0.0</a:t>
-                      </a:r>
-                      <a:endParaRPr lang="es-ES_tradnl" sz="1100" dirty="0">
-                        <a:latin typeface="Arial" charset="0"/>
-                        <a:ea typeface="Arial" charset="0"/>
-                        <a:cs typeface="Arial" charset="0"/>
-                      </a:endParaRPr>
-                    </a:p>
-                  </a:txBody>
-                  <a:tcPr marL="36000" marR="36000" marT="36000" marB="36000"/>
-                </a:tc>
-                <a:tc>
-                  <a:txBody>
-                    <a:bodyPr/>
-                    <a:lstStyle/>
-                    <a:p>
-                      <a:pPr>
-                        <a:defRPr sz="800">
-                          <a:solidFill>
-                            <a:srgbClr val="0B0B0B"/>
-                          </a:solidFill>
-                          <a:latin typeface="Arial"/>
-                        </a:defRPr>
-                      </a:pPr>
-                      <a:r>
-                        <a:t>202.0</a:t>
-                      </a:r>
+                      <a:endParaRPr lang="es-ES_tradnl" sz="1100" dirty="0">
+                        <a:latin typeface="Arial" charset="0"/>
+                        <a:ea typeface="Arial" charset="0"/>
+                        <a:cs typeface="Arial" charset="0"/>
+                      </a:endParaRPr>
+                    </a:p>
+                  </a:txBody>
+                  <a:tcPr marL="36000" marR="36000" marT="36000" marB="36000"/>
+                </a:tc>
+                <a:tc>
+                  <a:txBody>
+                    <a:bodyPr/>
+                    <a:lstStyle/>
+                    <a:p>
                       <a:endParaRPr lang="es-ES_tradnl" sz="1100">
                         <a:latin typeface="Arial" charset="0"/>
                         <a:ea typeface="Arial" charset="0"/>
@@ -6654,17 +6318,6 @@
                     <a:bodyPr/>
                     <a:lstStyle/>
                     <a:p>
-                      <a:pPr>
-                        <a:defRPr sz="800">
-                          <a:solidFill>
-                            <a:srgbClr val="0B0B0B"/>
-                          </a:solidFill>
-                          <a:latin typeface="Arial"/>
-                        </a:defRPr>
-                      </a:pPr>
-                      <a:r>
-                        <a:t>179174.0</a:t>
-                      </a:r>
                       <a:endParaRPr lang="es-ES_tradnl" sz="1100">
                         <a:latin typeface="Arial" charset="0"/>
                         <a:ea typeface="Arial" charset="0"/>

</xml_diff>